<commit_message>
Changed the folder structure. Reviewed each file and changed the files to maintain consistency. Added an image folder with images of the dashboard
</commit_message>
<xml_diff>
--- a/Loan Data Analysis and Dashboard Presentation.pptx
+++ b/Loan Data Analysis and Dashboard Presentation.pptx
@@ -284,7 +284,7 @@
           <a:p>
             <a:fld id="{7B289A56-B7BF-4EE2-A684-7373F14AFF3B}" type="datetimeFigureOut">
               <a:rPr lang="en-IN" smtClean="0"/>
-              <a:t>24-05-2024</a:t>
+              <a:t>27-05-2024</a:t>
             </a:fld>
             <a:endParaRPr lang="en-IN"/>
           </a:p>
@@ -484,7 +484,7 @@
           <a:p>
             <a:fld id="{7B289A56-B7BF-4EE2-A684-7373F14AFF3B}" type="datetimeFigureOut">
               <a:rPr lang="en-IN" smtClean="0"/>
-              <a:t>24-05-2024</a:t>
+              <a:t>27-05-2024</a:t>
             </a:fld>
             <a:endParaRPr lang="en-IN"/>
           </a:p>
@@ -694,7 +694,7 @@
           <a:p>
             <a:fld id="{7B289A56-B7BF-4EE2-A684-7373F14AFF3B}" type="datetimeFigureOut">
               <a:rPr lang="en-IN" smtClean="0"/>
-              <a:t>24-05-2024</a:t>
+              <a:t>27-05-2024</a:t>
             </a:fld>
             <a:endParaRPr lang="en-IN"/>
           </a:p>
@@ -894,7 +894,7 @@
           <a:p>
             <a:fld id="{7B289A56-B7BF-4EE2-A684-7373F14AFF3B}" type="datetimeFigureOut">
               <a:rPr lang="en-IN" smtClean="0"/>
-              <a:t>24-05-2024</a:t>
+              <a:t>27-05-2024</a:t>
             </a:fld>
             <a:endParaRPr lang="en-IN"/>
           </a:p>
@@ -1170,7 +1170,7 @@
           <a:p>
             <a:fld id="{7B289A56-B7BF-4EE2-A684-7373F14AFF3B}" type="datetimeFigureOut">
               <a:rPr lang="en-IN" smtClean="0"/>
-              <a:t>24-05-2024</a:t>
+              <a:t>27-05-2024</a:t>
             </a:fld>
             <a:endParaRPr lang="en-IN"/>
           </a:p>
@@ -1438,7 +1438,7 @@
           <a:p>
             <a:fld id="{7B289A56-B7BF-4EE2-A684-7373F14AFF3B}" type="datetimeFigureOut">
               <a:rPr lang="en-IN" smtClean="0"/>
-              <a:t>24-05-2024</a:t>
+              <a:t>27-05-2024</a:t>
             </a:fld>
             <a:endParaRPr lang="en-IN"/>
           </a:p>
@@ -1853,7 +1853,7 @@
           <a:p>
             <a:fld id="{7B289A56-B7BF-4EE2-A684-7373F14AFF3B}" type="datetimeFigureOut">
               <a:rPr lang="en-IN" smtClean="0"/>
-              <a:t>24-05-2024</a:t>
+              <a:t>27-05-2024</a:t>
             </a:fld>
             <a:endParaRPr lang="en-IN"/>
           </a:p>
@@ -1995,7 +1995,7 @@
           <a:p>
             <a:fld id="{7B289A56-B7BF-4EE2-A684-7373F14AFF3B}" type="datetimeFigureOut">
               <a:rPr lang="en-IN" smtClean="0"/>
-              <a:t>24-05-2024</a:t>
+              <a:t>27-05-2024</a:t>
             </a:fld>
             <a:endParaRPr lang="en-IN"/>
           </a:p>
@@ -2108,7 +2108,7 @@
           <a:p>
             <a:fld id="{7B289A56-B7BF-4EE2-A684-7373F14AFF3B}" type="datetimeFigureOut">
               <a:rPr lang="en-IN" smtClean="0"/>
-              <a:t>24-05-2024</a:t>
+              <a:t>27-05-2024</a:t>
             </a:fld>
             <a:endParaRPr lang="en-IN"/>
           </a:p>
@@ -2421,7 +2421,7 @@
           <a:p>
             <a:fld id="{7B289A56-B7BF-4EE2-A684-7373F14AFF3B}" type="datetimeFigureOut">
               <a:rPr lang="en-IN" smtClean="0"/>
-              <a:t>24-05-2024</a:t>
+              <a:t>27-05-2024</a:t>
             </a:fld>
             <a:endParaRPr lang="en-IN"/>
           </a:p>
@@ -2710,7 +2710,7 @@
           <a:p>
             <a:fld id="{7B289A56-B7BF-4EE2-A684-7373F14AFF3B}" type="datetimeFigureOut">
               <a:rPr lang="en-IN" smtClean="0"/>
-              <a:t>24-05-2024</a:t>
+              <a:t>27-05-2024</a:t>
             </a:fld>
             <a:endParaRPr lang="en-IN"/>
           </a:p>
@@ -2953,7 +2953,7 @@
           <a:p>
             <a:fld id="{7B289A56-B7BF-4EE2-A684-7373F14AFF3B}" type="datetimeFigureOut">
               <a:rPr lang="en-IN" smtClean="0"/>
-              <a:t>24-05-2024</a:t>
+              <a:t>27-05-2024</a:t>
             </a:fld>
             <a:endParaRPr lang="en-IN"/>
           </a:p>
@@ -3526,7 +3526,7 @@
               <a:rPr lang="en-IN" sz="1100" dirty="0">
                 <a:latin typeface="Georgia Pro" panose="02040502050405020303" pitchFamily="18" charset="0"/>
               </a:rPr>
-              <a:t>Date: 20</a:t>
+              <a:t>Date: 27</a:t>
             </a:r>
             <a:r>
               <a:rPr lang="en-IN" sz="1100" baseline="30000" dirty="0">
@@ -11421,12 +11421,66 @@
               </a:rPr>
               <a:t>The primary objective of the Details Dashboard is to provide a comprehensive and user-friendly interface for accessing vital loan data. It will serve as a one-stop solution for users seeking detailed insights into our loan portfolio, borrower profiles, and loan performance.</a:t>
             </a:r>
+          </a:p>
+          <a:p>
+            <a:pPr algn="just">
+              <a:lnSpc>
+                <a:spcPct val="150000"/>
+              </a:lnSpc>
+              <a:spcAft>
+                <a:spcPts val="800"/>
+              </a:spcAft>
+            </a:pPr>
+            <a:endParaRPr lang="en-IN" sz="1100" i="1" kern="100" dirty="0">
+              <a:latin typeface="Calibri" panose="020F0502020204030204" pitchFamily="34" charset="0"/>
+              <a:ea typeface="Calibri" panose="020F0502020204030204" pitchFamily="34" charset="0"/>
+              <a:cs typeface="Times New Roman" panose="02020603050405020304" pitchFamily="18" charset="0"/>
+            </a:endParaRPr>
+          </a:p>
+          <a:p>
+            <a:pPr algn="just">
+              <a:lnSpc>
+                <a:spcPct val="150000"/>
+              </a:lnSpc>
+              <a:spcAft>
+                <a:spcPts val="800"/>
+              </a:spcAft>
+            </a:pPr>
+            <a:r>
+              <a:rPr lang="en-IN" sz="1100" kern="100" dirty="0">
+                <a:effectLst/>
+                <a:latin typeface="Calibri" panose="020F0502020204030204" pitchFamily="34" charset="0"/>
+                <a:ea typeface="Calibri" panose="020F0502020204030204" pitchFamily="34" charset="0"/>
+                <a:cs typeface="Times New Roman" panose="02020603050405020304" pitchFamily="18" charset="0"/>
+                <a:hlinkClick r:id="rId4"/>
+              </a:rPr>
+              <a:t>SouvikGanguly@SouvikGanguly.onmicrosoft.com</a:t>
+            </a:r>
             <a:endParaRPr lang="en-IN" sz="1100" kern="100" dirty="0">
               <a:effectLst/>
               <a:latin typeface="Calibri" panose="020F0502020204030204" pitchFamily="34" charset="0"/>
               <a:ea typeface="Calibri" panose="020F0502020204030204" pitchFamily="34" charset="0"/>
               <a:cs typeface="Times New Roman" panose="02020603050405020304" pitchFamily="18" charset="0"/>
             </a:endParaRPr>
+          </a:p>
+          <a:p>
+            <a:pPr algn="just">
+              <a:lnSpc>
+                <a:spcPct val="150000"/>
+              </a:lnSpc>
+              <a:spcAft>
+                <a:spcPts val="800"/>
+              </a:spcAft>
+            </a:pPr>
+            <a:r>
+              <a:rPr lang="en-IN" sz="1100" kern="100" dirty="0">
+                <a:effectLst/>
+                <a:latin typeface="Calibri" panose="020F0502020204030204" pitchFamily="34" charset="0"/>
+                <a:ea typeface="Calibri" panose="020F0502020204030204" pitchFamily="34" charset="0"/>
+                <a:cs typeface="Times New Roman" panose="02020603050405020304" pitchFamily="18" charset="0"/>
+              </a:rPr>
+              <a:t>wqcaY6eWhv+b6SD</a:t>
+            </a:r>
           </a:p>
           <a:p>
             <a:endParaRPr lang="en-IN" sz="1100" b="1" kern="100" dirty="0">

</xml_diff>